<commit_message>
added some future suggestions to powerpoint
</commit_message>
<xml_diff>
--- a/CNN_eyeglasses/final/capstone2.pptx
+++ b/CNN_eyeglasses/final/capstone2.pptx
@@ -21,7 +21,8 @@
     <p:sldId id="274" r:id="rId15"/>
     <p:sldId id="275" r:id="rId16"/>
     <p:sldId id="276" r:id="rId17"/>
-    <p:sldId id="277" r:id="rId18"/>
+    <p:sldId id="278" r:id="rId18"/>
+    <p:sldId id="277" r:id="rId19"/>
   </p:sldIdLst>
   <p:sldSz cx="12192000" cy="6858000"/>
   <p:notesSz cx="6858000" cy="9144000"/>
@@ -324,7 +325,7 @@
           <a:p>
             <a:fld id="{4D1A0937-53FD-EB44-9E3A-FA18BA2F9F05}" type="datetimeFigureOut">
               <a:rPr lang="en-US" smtClean="0"/>
-              <a:t>2/13/19</a:t>
+              <a:t>4/1/19</a:t>
             </a:fld>
             <a:endParaRPr lang="en-US"/>
           </a:p>
@@ -605,7 +606,7 @@
           <a:p>
             <a:fld id="{4D1A0937-53FD-EB44-9E3A-FA18BA2F9F05}" type="datetimeFigureOut">
               <a:rPr lang="en-US" smtClean="0"/>
-              <a:t>2/13/19</a:t>
+              <a:t>4/1/19</a:t>
             </a:fld>
             <a:endParaRPr lang="en-US"/>
           </a:p>
@@ -797,7 +798,7 @@
           <a:p>
             <a:fld id="{4D1A0937-53FD-EB44-9E3A-FA18BA2F9F05}" type="datetimeFigureOut">
               <a:rPr lang="en-US" smtClean="0"/>
-              <a:t>2/13/19</a:t>
+              <a:t>4/1/19</a:t>
             </a:fld>
             <a:endParaRPr lang="en-US"/>
           </a:p>
@@ -1058,7 +1059,7 @@
           <a:p>
             <a:fld id="{4D1A0937-53FD-EB44-9E3A-FA18BA2F9F05}" type="datetimeFigureOut">
               <a:rPr lang="en-US" smtClean="0"/>
-              <a:t>2/13/19</a:t>
+              <a:t>4/1/19</a:t>
             </a:fld>
             <a:endParaRPr lang="en-US"/>
           </a:p>
@@ -1484,7 +1485,7 @@
           <a:p>
             <a:fld id="{4D1A0937-53FD-EB44-9E3A-FA18BA2F9F05}" type="datetimeFigureOut">
               <a:rPr lang="en-US" smtClean="0"/>
-              <a:t>2/13/19</a:t>
+              <a:t>4/1/19</a:t>
             </a:fld>
             <a:endParaRPr lang="en-US"/>
           </a:p>
@@ -2030,7 +2031,7 @@
           <a:p>
             <a:fld id="{4D1A0937-53FD-EB44-9E3A-FA18BA2F9F05}" type="datetimeFigureOut">
               <a:rPr lang="en-US" smtClean="0"/>
-              <a:t>2/13/19</a:t>
+              <a:t>4/1/19</a:t>
             </a:fld>
             <a:endParaRPr lang="en-US"/>
           </a:p>
@@ -2861,7 +2862,7 @@
           <a:p>
             <a:fld id="{4D1A0937-53FD-EB44-9E3A-FA18BA2F9F05}" type="datetimeFigureOut">
               <a:rPr lang="en-US" smtClean="0"/>
-              <a:t>2/13/19</a:t>
+              <a:t>4/1/19</a:t>
             </a:fld>
             <a:endParaRPr lang="en-US"/>
           </a:p>
@@ -3031,7 +3032,7 @@
           <a:p>
             <a:fld id="{4D1A0937-53FD-EB44-9E3A-FA18BA2F9F05}" type="datetimeFigureOut">
               <a:rPr lang="en-US" smtClean="0"/>
-              <a:t>2/13/19</a:t>
+              <a:t>4/1/19</a:t>
             </a:fld>
             <a:endParaRPr lang="en-US"/>
           </a:p>
@@ -3211,7 +3212,7 @@
           <a:p>
             <a:fld id="{4D1A0937-53FD-EB44-9E3A-FA18BA2F9F05}" type="datetimeFigureOut">
               <a:rPr lang="en-US" smtClean="0"/>
-              <a:t>2/13/19</a:t>
+              <a:t>4/1/19</a:t>
             </a:fld>
             <a:endParaRPr lang="en-US"/>
           </a:p>
@@ -3381,7 +3382,7 @@
           <a:p>
             <a:fld id="{4D1A0937-53FD-EB44-9E3A-FA18BA2F9F05}" type="datetimeFigureOut">
               <a:rPr lang="en-US" smtClean="0"/>
-              <a:t>2/13/19</a:t>
+              <a:t>4/1/19</a:t>
             </a:fld>
             <a:endParaRPr lang="en-US"/>
           </a:p>
@@ -3638,7 +3639,7 @@
           <a:p>
             <a:fld id="{4D1A0937-53FD-EB44-9E3A-FA18BA2F9F05}" type="datetimeFigureOut">
               <a:rPr lang="en-US" smtClean="0"/>
-              <a:t>2/13/19</a:t>
+              <a:t>4/1/19</a:t>
             </a:fld>
             <a:endParaRPr lang="en-US"/>
           </a:p>
@@ -3870,7 +3871,7 @@
           <a:p>
             <a:fld id="{4D1A0937-53FD-EB44-9E3A-FA18BA2F9F05}" type="datetimeFigureOut">
               <a:rPr lang="en-US" smtClean="0"/>
-              <a:t>2/13/19</a:t>
+              <a:t>4/1/19</a:t>
             </a:fld>
             <a:endParaRPr lang="en-US"/>
           </a:p>
@@ -4263,7 +4264,7 @@
           <a:p>
             <a:fld id="{4D1A0937-53FD-EB44-9E3A-FA18BA2F9F05}" type="datetimeFigureOut">
               <a:rPr lang="en-US" smtClean="0"/>
-              <a:t>2/13/19</a:t>
+              <a:t>4/1/19</a:t>
             </a:fld>
             <a:endParaRPr lang="en-US"/>
           </a:p>
@@ -4381,7 +4382,7 @@
           <a:p>
             <a:fld id="{4D1A0937-53FD-EB44-9E3A-FA18BA2F9F05}" type="datetimeFigureOut">
               <a:rPr lang="en-US" smtClean="0"/>
-              <a:t>2/13/19</a:t>
+              <a:t>4/1/19</a:t>
             </a:fld>
             <a:endParaRPr lang="en-US"/>
           </a:p>
@@ -4476,7 +4477,7 @@
           <a:p>
             <a:fld id="{4D1A0937-53FD-EB44-9E3A-FA18BA2F9F05}" type="datetimeFigureOut">
               <a:rPr lang="en-US" smtClean="0"/>
-              <a:t>2/13/19</a:t>
+              <a:t>4/1/19</a:t>
             </a:fld>
             <a:endParaRPr lang="en-US"/>
           </a:p>
@@ -4749,7 +4750,7 @@
           <a:p>
             <a:fld id="{4D1A0937-53FD-EB44-9E3A-FA18BA2F9F05}" type="datetimeFigureOut">
               <a:rPr lang="en-US" smtClean="0"/>
-              <a:t>2/13/19</a:t>
+              <a:t>4/1/19</a:t>
             </a:fld>
             <a:endParaRPr lang="en-US"/>
           </a:p>
@@ -5030,7 +5031,7 @@
           <a:p>
             <a:fld id="{4D1A0937-53FD-EB44-9E3A-FA18BA2F9F05}" type="datetimeFigureOut">
               <a:rPr lang="en-US" smtClean="0"/>
-              <a:t>2/13/19</a:t>
+              <a:t>4/1/19</a:t>
             </a:fld>
             <a:endParaRPr lang="en-US"/>
           </a:p>
@@ -5270,7 +5271,7 @@
           <a:p>
             <a:fld id="{4D1A0937-53FD-EB44-9E3A-FA18BA2F9F05}" type="datetimeFigureOut">
               <a:rPr lang="en-US" smtClean="0"/>
-              <a:t>2/13/19</a:t>
+              <a:t>4/1/19</a:t>
             </a:fld>
             <a:endParaRPr lang="en-US"/>
           </a:p>
@@ -7032,6 +7033,117 @@
             <p:ph type="title"/>
           </p:nvPr>
         </p:nvSpPr>
+        <p:spPr/>
+        <p:txBody>
+          <a:bodyPr/>
+          <a:lstStyle/>
+          <a:p>
+            <a:r>
+              <a:rPr lang="en-US" dirty="0" smtClean="0"/>
+              <a:t>Next Steps</a:t>
+            </a:r>
+            <a:endParaRPr lang="en-US" dirty="0"/>
+          </a:p>
+        </p:txBody>
+      </p:sp>
+      <p:sp>
+        <p:nvSpPr>
+          <p:cNvPr id="3" name="Content Placeholder 2"/>
+          <p:cNvSpPr>
+            <a:spLocks noGrp="1"/>
+          </p:cNvSpPr>
+          <p:nvPr>
+            <p:ph idx="1"/>
+          </p:nvPr>
+        </p:nvSpPr>
+        <p:spPr/>
+        <p:txBody>
+          <a:bodyPr/>
+          <a:lstStyle/>
+          <a:p>
+            <a:r>
+              <a:rPr lang="en-US" dirty="0" smtClean="0"/>
+              <a:t>Potential to generalize to more attributes and thus different companies with </a:t>
+            </a:r>
+            <a:r>
+              <a:rPr lang="en-US" dirty="0" err="1" smtClean="0"/>
+              <a:t>CelebA</a:t>
+            </a:r>
+            <a:r>
+              <a:rPr lang="en-US" dirty="0" smtClean="0"/>
+              <a:t> data set</a:t>
+            </a:r>
+          </a:p>
+          <a:p>
+            <a:r>
+              <a:rPr lang="en-US" dirty="0" smtClean="0"/>
+              <a:t>Automate process for scraping social media profile pictures</a:t>
+            </a:r>
+          </a:p>
+          <a:p>
+            <a:pPr marL="228600" lvl="1">
+              <a:spcBef>
+                <a:spcPts val="1000"/>
+              </a:spcBef>
+            </a:pPr>
+            <a:r>
+              <a:rPr lang="en-US" dirty="0"/>
+              <a:t>Could try applying matrix operations to training to account for translational/rotational invariance and improve the model</a:t>
+            </a:r>
+          </a:p>
+          <a:p>
+            <a:pPr lvl="1"/>
+            <a:r>
+              <a:rPr lang="en-US" dirty="0"/>
+              <a:t>Make less reliant on face aligner</a:t>
+            </a:r>
+          </a:p>
+          <a:p>
+            <a:pPr lvl="1"/>
+            <a:endParaRPr lang="en-US" dirty="0"/>
+          </a:p>
+        </p:txBody>
+      </p:sp>
+    </p:spTree>
+    <p:extLst>
+      <p:ext uri="{BB962C8B-B14F-4D97-AF65-F5344CB8AC3E}">
+        <p14:creationId xmlns:p14="http://schemas.microsoft.com/office/powerpoint/2010/main" val="1346357758"/>
+      </p:ext>
+    </p:extLst>
+  </p:cSld>
+  <p:clrMapOvr>
+    <a:masterClrMapping/>
+  </p:clrMapOvr>
+</p:sld>
+</file>
+
+<file path=ppt/slides/slide18.xml><?xml version="1.0" encoding="utf-8"?>
+<p:sld xmlns:a="http://schemas.openxmlformats.org/drawingml/2006/main" xmlns:r="http://schemas.openxmlformats.org/officeDocument/2006/relationships" xmlns:p="http://schemas.openxmlformats.org/presentationml/2006/main">
+  <p:cSld>
+    <p:spTree>
+      <p:nvGrpSpPr>
+        <p:cNvPr id="1" name=""/>
+        <p:cNvGrpSpPr/>
+        <p:nvPr/>
+      </p:nvGrpSpPr>
+      <p:grpSpPr>
+        <a:xfrm>
+          <a:off x="0" y="0"/>
+          <a:ext cx="0" cy="0"/>
+          <a:chOff x="0" y="0"/>
+          <a:chExt cx="0" cy="0"/>
+        </a:xfrm>
+      </p:grpSpPr>
+      <p:sp>
+        <p:nvSpPr>
+          <p:cNvPr id="2" name="Title 1"/>
+          <p:cNvSpPr>
+            <a:spLocks noGrp="1"/>
+          </p:cNvSpPr>
+          <p:nvPr>
+            <p:ph type="title"/>
+          </p:nvPr>
+        </p:nvSpPr>
         <p:spPr>
           <a:xfrm>
             <a:off x="838200" y="2625246"/>
@@ -8056,13 +8168,8 @@
             </a:r>
             <a:r>
               <a:rPr lang="en-US" dirty="0" smtClean="0"/>
-              <a:t> </a:t>
-            </a:r>
-            <a:r>
-              <a:rPr lang="en-US" dirty="0" smtClean="0"/>
-              <a:t>dataset (20 images)</a:t>
-            </a:r>
-            <a:endParaRPr lang="en-US" dirty="0" smtClean="0"/>
+              <a:t> dataset (20 images)</a:t>
+            </a:r>
           </a:p>
           <a:p>
             <a:pPr marL="0" indent="0">

</xml_diff>